<commit_message>
add new images and pdf
</commit_message>
<xml_diff>
--- a/Retail Sales Dashboard.pptx
+++ b/Retail Sales Dashboard.pptx
@@ -1,21 +1,21 @@
 
 <file path=ppt/presentation.xml><?xml version="1.0" encoding="utf-8"?>
-<p:presentation xmlns:a="http://schemas.openxmlformats.org/drawingml/2006/main" xmlns:r="http://schemas.openxmlformats.org/officeDocument/2006/relationships" xmlns:p="http://schemas.openxmlformats.org/presentationml/2006/main" saveSubsetFonts="1">
+<p:presentation xmlns:a="http://schemas.openxmlformats.org/drawingml/2006/main" xmlns:r="http://schemas.openxmlformats.org/officeDocument/2006/relationships" xmlns:p="http://schemas.openxmlformats.org/presentationml/2006/main">
   <p:sldMasterIdLst>
-    <p:sldMasterId id="2147483695" r:id="rId1"/>
+    <p:sldMasterId id="2147483648" r:id="rId1"/>
   </p:sldMasterIdLst>
   <p:sldIdLst>
-    <p:sldId id="262" r:id="rId2"/>
-    <p:sldId id="266" r:id="rId3"/>
-    <p:sldId id="256" r:id="rId4"/>
-    <p:sldId id="257" r:id="rId5"/>
-    <p:sldId id="258" r:id="rId6"/>
-    <p:sldId id="259" r:id="rId7"/>
-    <p:sldId id="260" r:id="rId8"/>
-    <p:sldId id="263" r:id="rId9"/>
-    <p:sldId id="264" r:id="rId10"/>
-    <p:sldId id="261" r:id="rId11"/>
-    <p:sldId id="265" r:id="rId12"/>
+    <p:sldId id="262" r:id="rId3"/>
+    <p:sldId id="266" r:id="rId4"/>
+    <p:sldId id="256" r:id="rId5"/>
+    <p:sldId id="257" r:id="rId6"/>
+    <p:sldId id="258" r:id="rId7"/>
+    <p:sldId id="259" r:id="rId8"/>
+    <p:sldId id="260" r:id="rId9"/>
+    <p:sldId id="263" r:id="rId10"/>
+    <p:sldId id="264" r:id="rId11"/>
+    <p:sldId id="261" r:id="rId12"/>
+    <p:sldId id="265" r:id="rId13"/>
   </p:sldIdLst>
   <p:sldSz cx="12192000" cy="6858000"/>
   <p:notesSz cx="6858000" cy="9144000"/>
@@ -114,11 +114,6 @@
       </a:defRPr>
     </a:lvl9pPr>
   </p:defaultTextStyle>
-  <p:extLst>
-    <p:ext uri="{EFAFB233-063F-42B5-8137-9DF3F51BA10A}">
-      <p15:sldGuideLst xmlns:p15="http://schemas.microsoft.com/office/powerpoint/2012/main"/>
-    </p:ext>
-  </p:extLst>
 </p:presentation>
 </file>
 
@@ -255,7 +250,6 @@
           <a:p>
             <a:fld id="{6D007ABD-EBBA-4429-9D37-844ACA18E6CA}" type="datetimeFigureOut">
               <a:rPr lang="en-IN" smtClean="0"/>
-              <a:t>09-07-2025</a:t>
             </a:fld>
             <a:endParaRPr lang="en-IN"/>
           </a:p>
@@ -297,18 +291,12 @@
           <a:p>
             <a:fld id="{DE243CA5-354C-49F7-9CA7-110AF9512DB1}" type="slidenum">
               <a:rPr lang="en-IN" smtClean="0"/>
-              <a:t>‹#›</a:t>
             </a:fld>
             <a:endParaRPr lang="en-IN"/>
           </a:p>
         </p:txBody>
       </p:sp>
     </p:spTree>
-    <p:extLst>
-      <p:ext uri="{BB962C8B-B14F-4D97-AF65-F5344CB8AC3E}">
-        <p14:creationId xmlns:p14="http://schemas.microsoft.com/office/powerpoint/2010/main" val="558727601"/>
-      </p:ext>
-    </p:extLst>
   </p:cSld>
   <p:clrMapOvr>
     <a:masterClrMapping/>
@@ -522,6 +510,7 @@
               <a:rPr lang="en-US"/>
               <a:t>Click to edit Master text styles</a:t>
             </a:r>
+            <a:endParaRPr lang="en-US"/>
           </a:p>
         </p:txBody>
       </p:sp>
@@ -542,7 +531,6 @@
           <a:p>
             <a:fld id="{6D007ABD-EBBA-4429-9D37-844ACA18E6CA}" type="datetimeFigureOut">
               <a:rPr lang="en-IN" smtClean="0"/>
-              <a:t>09-07-2025</a:t>
             </a:fld>
             <a:endParaRPr lang="en-IN"/>
           </a:p>
@@ -584,18 +572,12 @@
           <a:p>
             <a:fld id="{DE243CA5-354C-49F7-9CA7-110AF9512DB1}" type="slidenum">
               <a:rPr lang="en-IN" smtClean="0"/>
-              <a:t>‹#›</a:t>
             </a:fld>
             <a:endParaRPr lang="en-IN"/>
           </a:p>
         </p:txBody>
       </p:sp>
     </p:spTree>
-    <p:extLst>
-      <p:ext uri="{BB962C8B-B14F-4D97-AF65-F5344CB8AC3E}">
-        <p14:creationId xmlns:p14="http://schemas.microsoft.com/office/powerpoint/2010/main" val="1179840483"/>
-      </p:ext>
-    </p:extLst>
   </p:cSld>
   <p:clrMapOvr>
     <a:masterClrMapping/>
@@ -714,6 +696,7 @@
               <a:rPr lang="en-US"/>
               <a:t>Click to edit Master text styles</a:t>
             </a:r>
+            <a:endParaRPr lang="en-US"/>
           </a:p>
         </p:txBody>
       </p:sp>
@@ -734,7 +717,6 @@
           <a:p>
             <a:fld id="{6D007ABD-EBBA-4429-9D37-844ACA18E6CA}" type="datetimeFigureOut">
               <a:rPr lang="en-IN" smtClean="0"/>
-              <a:t>09-07-2025</a:t>
             </a:fld>
             <a:endParaRPr lang="en-IN"/>
           </a:p>
@@ -776,18 +758,12 @@
           <a:p>
             <a:fld id="{DE243CA5-354C-49F7-9CA7-110AF9512DB1}" type="slidenum">
               <a:rPr lang="en-IN" smtClean="0"/>
-              <a:t>‹#›</a:t>
             </a:fld>
             <a:endParaRPr lang="en-IN"/>
           </a:p>
         </p:txBody>
       </p:sp>
     </p:spTree>
-    <p:extLst>
-      <p:ext uri="{BB962C8B-B14F-4D97-AF65-F5344CB8AC3E}">
-        <p14:creationId xmlns:p14="http://schemas.microsoft.com/office/powerpoint/2010/main" val="419183598"/>
-      </p:ext>
-    </p:extLst>
   </p:cSld>
   <p:clrMapOvr>
     <a:masterClrMapping/>
@@ -908,6 +884,7 @@
               <a:rPr lang="en-US"/>
               <a:t>Click to edit Master text styles</a:t>
             </a:r>
+            <a:endParaRPr lang="en-US"/>
           </a:p>
         </p:txBody>
       </p:sp>
@@ -975,6 +952,7 @@
               <a:rPr lang="en-US"/>
               <a:t>Click to edit Master text styles</a:t>
             </a:r>
+            <a:endParaRPr lang="en-US"/>
           </a:p>
         </p:txBody>
       </p:sp>
@@ -995,7 +973,6 @@
           <a:p>
             <a:fld id="{6D007ABD-EBBA-4429-9D37-844ACA18E6CA}" type="datetimeFigureOut">
               <a:rPr lang="en-IN" smtClean="0"/>
-              <a:t>09-07-2025</a:t>
             </a:fld>
             <a:endParaRPr lang="en-IN"/>
           </a:p>
@@ -1037,7 +1014,6 @@
           <a:p>
             <a:fld id="{DE243CA5-354C-49F7-9CA7-110AF9512DB1}" type="slidenum">
               <a:rPr lang="en-IN" smtClean="0"/>
-              <a:t>‹#›</a:t>
             </a:fld>
             <a:endParaRPr lang="en-IN"/>
           </a:p>
@@ -1156,6 +1132,12 @@
               </a:rPr>
               <a:t>“</a:t>
             </a:r>
+            <a:endParaRPr lang="en-US" sz="8000" dirty="0">
+              <a:solidFill>
+                <a:schemeClr val="tx1"/>
+              </a:solidFill>
+              <a:effectLst/>
+            </a:endParaRPr>
           </a:p>
         </p:txBody>
       </p:sp>
@@ -1272,15 +1254,16 @@
               </a:rPr>
               <a:t>”</a:t>
             </a:r>
+            <a:endParaRPr lang="en-US" sz="8000" dirty="0">
+              <a:solidFill>
+                <a:schemeClr val="tx1"/>
+              </a:solidFill>
+              <a:effectLst/>
+            </a:endParaRPr>
           </a:p>
         </p:txBody>
       </p:sp>
     </p:spTree>
-    <p:extLst>
-      <p:ext uri="{BB962C8B-B14F-4D97-AF65-F5344CB8AC3E}">
-        <p14:creationId xmlns:p14="http://schemas.microsoft.com/office/powerpoint/2010/main" val="1876153322"/>
-      </p:ext>
-    </p:extLst>
   </p:cSld>
   <p:clrMapOvr>
     <a:masterClrMapping/>
@@ -1399,6 +1382,7 @@
               <a:rPr lang="en-US"/>
               <a:t>Click to edit Master text styles</a:t>
             </a:r>
+            <a:endParaRPr lang="en-US"/>
           </a:p>
         </p:txBody>
       </p:sp>
@@ -1419,7 +1403,6 @@
           <a:p>
             <a:fld id="{6D007ABD-EBBA-4429-9D37-844ACA18E6CA}" type="datetimeFigureOut">
               <a:rPr lang="en-IN" smtClean="0"/>
-              <a:t>09-07-2025</a:t>
             </a:fld>
             <a:endParaRPr lang="en-IN"/>
           </a:p>
@@ -1461,18 +1444,12 @@
           <a:p>
             <a:fld id="{DE243CA5-354C-49F7-9CA7-110AF9512DB1}" type="slidenum">
               <a:rPr lang="en-IN" smtClean="0"/>
-              <a:t>‹#›</a:t>
             </a:fld>
             <a:endParaRPr lang="en-IN"/>
           </a:p>
         </p:txBody>
       </p:sp>
     </p:spTree>
-    <p:extLst>
-      <p:ext uri="{BB962C8B-B14F-4D97-AF65-F5344CB8AC3E}">
-        <p14:creationId xmlns:p14="http://schemas.microsoft.com/office/powerpoint/2010/main" val="3819080146"/>
-      </p:ext>
-    </p:extLst>
   </p:cSld>
   <p:clrMapOvr>
     <a:masterClrMapping/>
@@ -1596,6 +1573,7 @@
               <a:rPr lang="en-US"/>
               <a:t>Click to edit Master text styles</a:t>
             </a:r>
+            <a:endParaRPr lang="en-US"/>
           </a:p>
         </p:txBody>
       </p:sp>
@@ -1663,6 +1641,7 @@
               <a:rPr lang="en-US"/>
               <a:t>Click to edit Master text styles</a:t>
             </a:r>
+            <a:endParaRPr lang="en-US"/>
           </a:p>
         </p:txBody>
       </p:sp>
@@ -1737,6 +1716,7 @@
               <a:rPr lang="en-US"/>
               <a:t>Click to edit Master text styles</a:t>
             </a:r>
+            <a:endParaRPr lang="en-US"/>
           </a:p>
         </p:txBody>
       </p:sp>
@@ -1804,6 +1784,7 @@
               <a:rPr lang="en-US"/>
               <a:t>Click to edit Master text styles</a:t>
             </a:r>
+            <a:endParaRPr lang="en-US"/>
           </a:p>
         </p:txBody>
       </p:sp>
@@ -1878,6 +1859,7 @@
               <a:rPr lang="en-US"/>
               <a:t>Click to edit Master text styles</a:t>
             </a:r>
+            <a:endParaRPr lang="en-US"/>
           </a:p>
         </p:txBody>
       </p:sp>
@@ -1945,6 +1927,7 @@
               <a:rPr lang="en-US"/>
               <a:t>Click to edit Master text styles</a:t>
             </a:r>
+            <a:endParaRPr lang="en-US"/>
           </a:p>
         </p:txBody>
       </p:sp>
@@ -1965,7 +1948,6 @@
           <a:p>
             <a:fld id="{6D007ABD-EBBA-4429-9D37-844ACA18E6CA}" type="datetimeFigureOut">
               <a:rPr lang="en-IN" smtClean="0"/>
-              <a:t>09-07-2025</a:t>
             </a:fld>
             <a:endParaRPr lang="en-IN"/>
           </a:p>
@@ -2007,18 +1989,12 @@
           <a:p>
             <a:fld id="{DE243CA5-354C-49F7-9CA7-110AF9512DB1}" type="slidenum">
               <a:rPr lang="en-IN" smtClean="0"/>
-              <a:t>‹#›</a:t>
             </a:fld>
             <a:endParaRPr lang="en-IN"/>
           </a:p>
         </p:txBody>
       </p:sp>
     </p:spTree>
-    <p:extLst>
-      <p:ext uri="{BB962C8B-B14F-4D97-AF65-F5344CB8AC3E}">
-        <p14:creationId xmlns:p14="http://schemas.microsoft.com/office/powerpoint/2010/main" val="2103347575"/>
-      </p:ext>
-    </p:extLst>
   </p:cSld>
   <p:clrMapOvr>
     <a:masterClrMapping/>
@@ -2142,6 +2118,7 @@
               <a:rPr lang="en-US"/>
               <a:t>Click to edit Master text styles</a:t>
             </a:r>
+            <a:endParaRPr lang="en-US"/>
           </a:p>
         </p:txBody>
       </p:sp>
@@ -2307,6 +2284,7 @@
               <a:rPr lang="en-US"/>
               <a:t>Click to edit Master text styles</a:t>
             </a:r>
+            <a:endParaRPr lang="en-US"/>
           </a:p>
         </p:txBody>
       </p:sp>
@@ -2381,6 +2359,7 @@
               <a:rPr lang="en-US"/>
               <a:t>Click to edit Master text styles</a:t>
             </a:r>
+            <a:endParaRPr lang="en-US"/>
           </a:p>
         </p:txBody>
       </p:sp>
@@ -2546,6 +2525,7 @@
               <a:rPr lang="en-US"/>
               <a:t>Click to edit Master text styles</a:t>
             </a:r>
+            <a:endParaRPr lang="en-US"/>
           </a:p>
         </p:txBody>
       </p:sp>
@@ -2620,6 +2600,7 @@
               <a:rPr lang="en-US"/>
               <a:t>Click to edit Master text styles</a:t>
             </a:r>
+            <a:endParaRPr lang="en-US"/>
           </a:p>
         </p:txBody>
       </p:sp>
@@ -2785,6 +2766,7 @@
               <a:rPr lang="en-US"/>
               <a:t>Click to edit Master text styles</a:t>
             </a:r>
+            <a:endParaRPr lang="en-US"/>
           </a:p>
         </p:txBody>
       </p:sp>
@@ -2805,7 +2787,6 @@
           <a:p>
             <a:fld id="{6D007ABD-EBBA-4429-9D37-844ACA18E6CA}" type="datetimeFigureOut">
               <a:rPr lang="en-IN" smtClean="0"/>
-              <a:t>09-07-2025</a:t>
             </a:fld>
             <a:endParaRPr lang="en-IN"/>
           </a:p>
@@ -2847,18 +2828,12 @@
           <a:p>
             <a:fld id="{DE243CA5-354C-49F7-9CA7-110AF9512DB1}" type="slidenum">
               <a:rPr lang="en-IN" smtClean="0"/>
-              <a:t>‹#›</a:t>
             </a:fld>
             <a:endParaRPr lang="en-IN"/>
           </a:p>
         </p:txBody>
       </p:sp>
     </p:spTree>
-    <p:extLst>
-      <p:ext uri="{BB962C8B-B14F-4D97-AF65-F5344CB8AC3E}">
-        <p14:creationId xmlns:p14="http://schemas.microsoft.com/office/powerpoint/2010/main" val="1365356184"/>
-      </p:ext>
-    </p:extLst>
   </p:cSld>
   <p:clrMapOvr>
     <a:masterClrMapping/>
@@ -2926,6 +2901,7 @@
               <a:rPr lang="en-US"/>
               <a:t>Click to edit Master text styles</a:t>
             </a:r>
+            <a:endParaRPr lang="en-US"/>
           </a:p>
           <a:p>
             <a:pPr lvl="1"/>
@@ -2933,6 +2909,7 @@
               <a:rPr lang="en-US"/>
               <a:t>Second level</a:t>
             </a:r>
+            <a:endParaRPr lang="en-US"/>
           </a:p>
           <a:p>
             <a:pPr lvl="2"/>
@@ -2940,6 +2917,7 @@
               <a:rPr lang="en-US"/>
               <a:t>Third level</a:t>
             </a:r>
+            <a:endParaRPr lang="en-US"/>
           </a:p>
           <a:p>
             <a:pPr lvl="3"/>
@@ -2947,6 +2925,7 @@
               <a:rPr lang="en-US"/>
               <a:t>Fourth level</a:t>
             </a:r>
+            <a:endParaRPr lang="en-US"/>
           </a:p>
           <a:p>
             <a:pPr lvl="4"/>
@@ -2975,7 +2954,6 @@
           <a:p>
             <a:fld id="{6D007ABD-EBBA-4429-9D37-844ACA18E6CA}" type="datetimeFigureOut">
               <a:rPr lang="en-IN" smtClean="0"/>
-              <a:t>09-07-2025</a:t>
             </a:fld>
             <a:endParaRPr lang="en-IN"/>
           </a:p>
@@ -3017,18 +2995,12 @@
           <a:p>
             <a:fld id="{DE243CA5-354C-49F7-9CA7-110AF9512DB1}" type="slidenum">
               <a:rPr lang="en-IN" smtClean="0"/>
-              <a:t>‹#›</a:t>
             </a:fld>
             <a:endParaRPr lang="en-IN"/>
           </a:p>
         </p:txBody>
       </p:sp>
     </p:spTree>
-    <p:extLst>
-      <p:ext uri="{BB962C8B-B14F-4D97-AF65-F5344CB8AC3E}">
-        <p14:creationId xmlns:p14="http://schemas.microsoft.com/office/powerpoint/2010/main" val="150959168"/>
-      </p:ext>
-    </p:extLst>
   </p:cSld>
   <p:clrMapOvr>
     <a:masterClrMapping/>
@@ -3110,6 +3082,7 @@
               <a:rPr lang="en-US"/>
               <a:t>Click to edit Master text styles</a:t>
             </a:r>
+            <a:endParaRPr lang="en-US"/>
           </a:p>
           <a:p>
             <a:pPr lvl="1"/>
@@ -3117,6 +3090,7 @@
               <a:rPr lang="en-US"/>
               <a:t>Second level</a:t>
             </a:r>
+            <a:endParaRPr lang="en-US"/>
           </a:p>
           <a:p>
             <a:pPr lvl="2"/>
@@ -3124,6 +3098,7 @@
               <a:rPr lang="en-US"/>
               <a:t>Third level</a:t>
             </a:r>
+            <a:endParaRPr lang="en-US"/>
           </a:p>
           <a:p>
             <a:pPr lvl="3"/>
@@ -3131,6 +3106,7 @@
               <a:rPr lang="en-US"/>
               <a:t>Fourth level</a:t>
             </a:r>
+            <a:endParaRPr lang="en-US"/>
           </a:p>
           <a:p>
             <a:pPr lvl="4"/>
@@ -3159,7 +3135,6 @@
           <a:p>
             <a:fld id="{6D007ABD-EBBA-4429-9D37-844ACA18E6CA}" type="datetimeFigureOut">
               <a:rPr lang="en-IN" smtClean="0"/>
-              <a:t>09-07-2025</a:t>
             </a:fld>
             <a:endParaRPr lang="en-IN"/>
           </a:p>
@@ -3201,18 +3176,12 @@
           <a:p>
             <a:fld id="{DE243CA5-354C-49F7-9CA7-110AF9512DB1}" type="slidenum">
               <a:rPr lang="en-IN" smtClean="0"/>
-              <a:t>‹#›</a:t>
             </a:fld>
             <a:endParaRPr lang="en-IN"/>
           </a:p>
         </p:txBody>
       </p:sp>
     </p:spTree>
-    <p:extLst>
-      <p:ext uri="{BB962C8B-B14F-4D97-AF65-F5344CB8AC3E}">
-        <p14:creationId xmlns:p14="http://schemas.microsoft.com/office/powerpoint/2010/main" val="2807633465"/>
-      </p:ext>
-    </p:extLst>
   </p:cSld>
   <p:clrMapOvr>
     <a:masterClrMapping/>
@@ -3280,6 +3249,7 @@
               <a:rPr lang="en-US"/>
               <a:t>Click to edit Master text styles</a:t>
             </a:r>
+            <a:endParaRPr lang="en-US"/>
           </a:p>
           <a:p>
             <a:pPr lvl="1"/>
@@ -3287,6 +3257,7 @@
               <a:rPr lang="en-US"/>
               <a:t>Second level</a:t>
             </a:r>
+            <a:endParaRPr lang="en-US"/>
           </a:p>
           <a:p>
             <a:pPr lvl="2"/>
@@ -3294,6 +3265,7 @@
               <a:rPr lang="en-US"/>
               <a:t>Third level</a:t>
             </a:r>
+            <a:endParaRPr lang="en-US"/>
           </a:p>
           <a:p>
             <a:pPr lvl="3"/>
@@ -3301,6 +3273,7 @@
               <a:rPr lang="en-US"/>
               <a:t>Fourth level</a:t>
             </a:r>
+            <a:endParaRPr lang="en-US"/>
           </a:p>
           <a:p>
             <a:pPr lvl="4"/>
@@ -3329,7 +3302,6 @@
           <a:p>
             <a:fld id="{6D007ABD-EBBA-4429-9D37-844ACA18E6CA}" type="datetimeFigureOut">
               <a:rPr lang="en-IN" smtClean="0"/>
-              <a:t>09-07-2025</a:t>
             </a:fld>
             <a:endParaRPr lang="en-IN"/>
           </a:p>
@@ -3371,18 +3343,12 @@
           <a:p>
             <a:fld id="{DE243CA5-354C-49F7-9CA7-110AF9512DB1}" type="slidenum">
               <a:rPr lang="en-IN" smtClean="0"/>
-              <a:t>‹#›</a:t>
             </a:fld>
             <a:endParaRPr lang="en-IN"/>
           </a:p>
         </p:txBody>
       </p:sp>
     </p:spTree>
-    <p:extLst>
-      <p:ext uri="{BB962C8B-B14F-4D97-AF65-F5344CB8AC3E}">
-        <p14:creationId xmlns:p14="http://schemas.microsoft.com/office/powerpoint/2010/main" val="2743858118"/>
-      </p:ext>
-    </p:extLst>
   </p:cSld>
   <p:clrMapOvr>
     <a:masterClrMapping/>
@@ -3557,6 +3523,7 @@
               <a:rPr lang="en-US"/>
               <a:t>Click to edit Master text styles</a:t>
             </a:r>
+            <a:endParaRPr lang="en-US"/>
           </a:p>
         </p:txBody>
       </p:sp>
@@ -3577,7 +3544,6 @@
           <a:p>
             <a:fld id="{6D007ABD-EBBA-4429-9D37-844ACA18E6CA}" type="datetimeFigureOut">
               <a:rPr lang="en-IN" smtClean="0"/>
-              <a:t>09-07-2025</a:t>
             </a:fld>
             <a:endParaRPr lang="en-IN"/>
           </a:p>
@@ -3619,18 +3585,12 @@
           <a:p>
             <a:fld id="{DE243CA5-354C-49F7-9CA7-110AF9512DB1}" type="slidenum">
               <a:rPr lang="en-IN" smtClean="0"/>
-              <a:t>‹#›</a:t>
             </a:fld>
             <a:endParaRPr lang="en-IN"/>
           </a:p>
         </p:txBody>
       </p:sp>
     </p:spTree>
-    <p:extLst>
-      <p:ext uri="{BB962C8B-B14F-4D97-AF65-F5344CB8AC3E}">
-        <p14:creationId xmlns:p14="http://schemas.microsoft.com/office/powerpoint/2010/main" val="258072981"/>
-      </p:ext>
-    </p:extLst>
   </p:cSld>
   <p:clrMapOvr>
     <a:masterClrMapping/>
@@ -3708,6 +3668,7 @@
               <a:rPr lang="en-US"/>
               <a:t>Click to edit Master text styles</a:t>
             </a:r>
+            <a:endParaRPr lang="en-US"/>
           </a:p>
           <a:p>
             <a:pPr lvl="1"/>
@@ -3715,6 +3676,7 @@
               <a:rPr lang="en-US"/>
               <a:t>Second level</a:t>
             </a:r>
+            <a:endParaRPr lang="en-US"/>
           </a:p>
           <a:p>
             <a:pPr lvl="2"/>
@@ -3722,6 +3684,7 @@
               <a:rPr lang="en-US"/>
               <a:t>Third level</a:t>
             </a:r>
+            <a:endParaRPr lang="en-US"/>
           </a:p>
           <a:p>
             <a:pPr lvl="3"/>
@@ -3729,6 +3692,7 @@
               <a:rPr lang="en-US"/>
               <a:t>Fourth level</a:t>
             </a:r>
+            <a:endParaRPr lang="en-US"/>
           </a:p>
           <a:p>
             <a:pPr lvl="4"/>
@@ -3765,6 +3729,7 @@
               <a:rPr lang="en-US"/>
               <a:t>Click to edit Master text styles</a:t>
             </a:r>
+            <a:endParaRPr lang="en-US"/>
           </a:p>
           <a:p>
             <a:pPr lvl="1"/>
@@ -3772,6 +3737,7 @@
               <a:rPr lang="en-US"/>
               <a:t>Second level</a:t>
             </a:r>
+            <a:endParaRPr lang="en-US"/>
           </a:p>
           <a:p>
             <a:pPr lvl="2"/>
@@ -3779,6 +3745,7 @@
               <a:rPr lang="en-US"/>
               <a:t>Third level</a:t>
             </a:r>
+            <a:endParaRPr lang="en-US"/>
           </a:p>
           <a:p>
             <a:pPr lvl="3"/>
@@ -3786,6 +3753,7 @@
               <a:rPr lang="en-US"/>
               <a:t>Fourth level</a:t>
             </a:r>
+            <a:endParaRPr lang="en-US"/>
           </a:p>
           <a:p>
             <a:pPr lvl="4"/>
@@ -3814,7 +3782,6 @@
           <a:p>
             <a:fld id="{6D007ABD-EBBA-4429-9D37-844ACA18E6CA}" type="datetimeFigureOut">
               <a:rPr lang="en-IN" smtClean="0"/>
-              <a:t>09-07-2025</a:t>
             </a:fld>
             <a:endParaRPr lang="en-IN"/>
           </a:p>
@@ -3856,18 +3823,12 @@
           <a:p>
             <a:fld id="{DE243CA5-354C-49F7-9CA7-110AF9512DB1}" type="slidenum">
               <a:rPr lang="en-IN" smtClean="0"/>
-              <a:t>‹#›</a:t>
             </a:fld>
             <a:endParaRPr lang="en-IN"/>
           </a:p>
         </p:txBody>
       </p:sp>
     </p:spTree>
-    <p:extLst>
-      <p:ext uri="{BB962C8B-B14F-4D97-AF65-F5344CB8AC3E}">
-        <p14:creationId xmlns:p14="http://schemas.microsoft.com/office/powerpoint/2010/main" val="198556366"/>
-      </p:ext>
-    </p:extLst>
   </p:cSld>
   <p:clrMapOvr>
     <a:masterClrMapping/>
@@ -3985,6 +3946,7 @@
               <a:rPr lang="en-US"/>
               <a:t>Click to edit Master text styles</a:t>
             </a:r>
+            <a:endParaRPr lang="en-US"/>
           </a:p>
         </p:txBody>
       </p:sp>
@@ -4013,6 +3975,7 @@
               <a:rPr lang="en-US"/>
               <a:t>Click to edit Master text styles</a:t>
             </a:r>
+            <a:endParaRPr lang="en-US"/>
           </a:p>
           <a:p>
             <a:pPr lvl="1"/>
@@ -4020,6 +3983,7 @@
               <a:rPr lang="en-US"/>
               <a:t>Second level</a:t>
             </a:r>
+            <a:endParaRPr lang="en-US"/>
           </a:p>
           <a:p>
             <a:pPr lvl="2"/>
@@ -4027,6 +3991,7 @@
               <a:rPr lang="en-US"/>
               <a:t>Third level</a:t>
             </a:r>
+            <a:endParaRPr lang="en-US"/>
           </a:p>
           <a:p>
             <a:pPr lvl="3"/>
@@ -4034,6 +3999,7 @@
               <a:rPr lang="en-US"/>
               <a:t>Fourth level</a:t>
             </a:r>
+            <a:endParaRPr lang="en-US"/>
           </a:p>
           <a:p>
             <a:pPr lvl="4"/>
@@ -4110,6 +4076,7 @@
               <a:rPr lang="en-US"/>
               <a:t>Click to edit Master text styles</a:t>
             </a:r>
+            <a:endParaRPr lang="en-US"/>
           </a:p>
         </p:txBody>
       </p:sp>
@@ -4138,6 +4105,7 @@
               <a:rPr lang="en-US"/>
               <a:t>Click to edit Master text styles</a:t>
             </a:r>
+            <a:endParaRPr lang="en-US"/>
           </a:p>
           <a:p>
             <a:pPr lvl="1"/>
@@ -4145,6 +4113,7 @@
               <a:rPr lang="en-US"/>
               <a:t>Second level</a:t>
             </a:r>
+            <a:endParaRPr lang="en-US"/>
           </a:p>
           <a:p>
             <a:pPr lvl="2"/>
@@ -4152,6 +4121,7 @@
               <a:rPr lang="en-US"/>
               <a:t>Third level</a:t>
             </a:r>
+            <a:endParaRPr lang="en-US"/>
           </a:p>
           <a:p>
             <a:pPr lvl="3"/>
@@ -4159,6 +4129,7 @@
               <a:rPr lang="en-US"/>
               <a:t>Fourth level</a:t>
             </a:r>
+            <a:endParaRPr lang="en-US"/>
           </a:p>
           <a:p>
             <a:pPr lvl="4"/>
@@ -4187,7 +4158,6 @@
           <a:p>
             <a:fld id="{6D007ABD-EBBA-4429-9D37-844ACA18E6CA}" type="datetimeFigureOut">
               <a:rPr lang="en-IN" smtClean="0"/>
-              <a:t>09-07-2025</a:t>
             </a:fld>
             <a:endParaRPr lang="en-IN"/>
           </a:p>
@@ -4229,18 +4199,12 @@
           <a:p>
             <a:fld id="{DE243CA5-354C-49F7-9CA7-110AF9512DB1}" type="slidenum">
               <a:rPr lang="en-IN" smtClean="0"/>
-              <a:t>‹#›</a:t>
             </a:fld>
             <a:endParaRPr lang="en-IN"/>
           </a:p>
         </p:txBody>
       </p:sp>
     </p:spTree>
-    <p:extLst>
-      <p:ext uri="{BB962C8B-B14F-4D97-AF65-F5344CB8AC3E}">
-        <p14:creationId xmlns:p14="http://schemas.microsoft.com/office/powerpoint/2010/main" val="1217754293"/>
-      </p:ext>
-    </p:extLst>
   </p:cSld>
   <p:clrMapOvr>
     <a:masterClrMapping/>
@@ -4305,7 +4269,6 @@
           <a:p>
             <a:fld id="{6D007ABD-EBBA-4429-9D37-844ACA18E6CA}" type="datetimeFigureOut">
               <a:rPr lang="en-IN" smtClean="0"/>
-              <a:t>09-07-2025</a:t>
             </a:fld>
             <a:endParaRPr lang="en-IN"/>
           </a:p>
@@ -4347,18 +4310,12 @@
           <a:p>
             <a:fld id="{DE243CA5-354C-49F7-9CA7-110AF9512DB1}" type="slidenum">
               <a:rPr lang="en-IN" smtClean="0"/>
-              <a:t>‹#›</a:t>
             </a:fld>
             <a:endParaRPr lang="en-IN"/>
           </a:p>
         </p:txBody>
       </p:sp>
     </p:spTree>
-    <p:extLst>
-      <p:ext uri="{BB962C8B-B14F-4D97-AF65-F5344CB8AC3E}">
-        <p14:creationId xmlns:p14="http://schemas.microsoft.com/office/powerpoint/2010/main" val="821466559"/>
-      </p:ext>
-    </p:extLst>
   </p:cSld>
   <p:clrMapOvr>
     <a:masterClrMapping/>
@@ -4400,7 +4357,6 @@
           <a:p>
             <a:fld id="{6D007ABD-EBBA-4429-9D37-844ACA18E6CA}" type="datetimeFigureOut">
               <a:rPr lang="en-IN" smtClean="0"/>
-              <a:t>09-07-2025</a:t>
             </a:fld>
             <a:endParaRPr lang="en-IN"/>
           </a:p>
@@ -4442,18 +4398,12 @@
           <a:p>
             <a:fld id="{DE243CA5-354C-49F7-9CA7-110AF9512DB1}" type="slidenum">
               <a:rPr lang="en-IN" smtClean="0"/>
-              <a:t>‹#›</a:t>
             </a:fld>
             <a:endParaRPr lang="en-IN"/>
           </a:p>
         </p:txBody>
       </p:sp>
     </p:spTree>
-    <p:extLst>
-      <p:ext uri="{BB962C8B-B14F-4D97-AF65-F5344CB8AC3E}">
-        <p14:creationId xmlns:p14="http://schemas.microsoft.com/office/powerpoint/2010/main" val="1537541623"/>
-      </p:ext>
-    </p:extLst>
   </p:cSld>
   <p:clrMapOvr>
     <a:masterClrMapping/>
@@ -4537,6 +4487,7 @@
               <a:rPr lang="en-US"/>
               <a:t>Click to edit Master text styles</a:t>
             </a:r>
+            <a:endParaRPr lang="en-US"/>
           </a:p>
           <a:p>
             <a:pPr lvl="1"/>
@@ -4544,6 +4495,7 @@
               <a:rPr lang="en-US"/>
               <a:t>Second level</a:t>
             </a:r>
+            <a:endParaRPr lang="en-US"/>
           </a:p>
           <a:p>
             <a:pPr lvl="2"/>
@@ -4551,6 +4503,7 @@
               <a:rPr lang="en-US"/>
               <a:t>Third level</a:t>
             </a:r>
+            <a:endParaRPr lang="en-US"/>
           </a:p>
           <a:p>
             <a:pPr lvl="3"/>
@@ -4558,6 +4511,7 @@
               <a:rPr lang="en-US"/>
               <a:t>Fourth level</a:t>
             </a:r>
+            <a:endParaRPr lang="en-US"/>
           </a:p>
           <a:p>
             <a:pPr lvl="4"/>
@@ -4631,6 +4585,7 @@
               <a:rPr lang="en-US"/>
               <a:t>Click to edit Master text styles</a:t>
             </a:r>
+            <a:endParaRPr lang="en-US"/>
           </a:p>
         </p:txBody>
       </p:sp>
@@ -4651,7 +4606,6 @@
           <a:p>
             <a:fld id="{6D007ABD-EBBA-4429-9D37-844ACA18E6CA}" type="datetimeFigureOut">
               <a:rPr lang="en-IN" smtClean="0"/>
-              <a:t>09-07-2025</a:t>
             </a:fld>
             <a:endParaRPr lang="en-IN"/>
           </a:p>
@@ -4693,18 +4647,12 @@
           <a:p>
             <a:fld id="{DE243CA5-354C-49F7-9CA7-110AF9512DB1}" type="slidenum">
               <a:rPr lang="en-IN" smtClean="0"/>
-              <a:t>‹#›</a:t>
             </a:fld>
             <a:endParaRPr lang="en-IN"/>
           </a:p>
         </p:txBody>
       </p:sp>
     </p:spTree>
-    <p:extLst>
-      <p:ext uri="{BB962C8B-B14F-4D97-AF65-F5344CB8AC3E}">
-        <p14:creationId xmlns:p14="http://schemas.microsoft.com/office/powerpoint/2010/main" val="2272992986"/>
-      </p:ext>
-    </p:extLst>
   </p:cSld>
   <p:clrMapOvr>
     <a:masterClrMapping/>
@@ -4918,6 +4866,7 @@
               <a:rPr lang="en-US"/>
               <a:t>Click to edit Master text styles</a:t>
             </a:r>
+            <a:endParaRPr lang="en-US"/>
           </a:p>
         </p:txBody>
       </p:sp>
@@ -4938,7 +4887,6 @@
           <a:p>
             <a:fld id="{6D007ABD-EBBA-4429-9D37-844ACA18E6CA}" type="datetimeFigureOut">
               <a:rPr lang="en-IN" smtClean="0"/>
-              <a:t>09-07-2025</a:t>
             </a:fld>
             <a:endParaRPr lang="en-IN"/>
           </a:p>
@@ -4980,18 +4928,12 @@
           <a:p>
             <a:fld id="{DE243CA5-354C-49F7-9CA7-110AF9512DB1}" type="slidenum">
               <a:rPr lang="en-IN" smtClean="0"/>
-              <a:t>‹#›</a:t>
             </a:fld>
             <a:endParaRPr lang="en-IN"/>
           </a:p>
         </p:txBody>
       </p:sp>
     </p:spTree>
-    <p:extLst>
-      <p:ext uri="{BB962C8B-B14F-4D97-AF65-F5344CB8AC3E}">
-        <p14:creationId xmlns:p14="http://schemas.microsoft.com/office/powerpoint/2010/main" val="2499515654"/>
-      </p:ext>
-    </p:extLst>
   </p:cSld>
   <p:clrMapOvr>
     <a:masterClrMapping/>
@@ -5084,6 +5026,7 @@
               <a:rPr lang="en-US"/>
               <a:t>Click to edit Master text styles</a:t>
             </a:r>
+            <a:endParaRPr lang="en-US"/>
           </a:p>
           <a:p>
             <a:pPr lvl="1"/>
@@ -5091,6 +5034,7 @@
               <a:rPr lang="en-US"/>
               <a:t>Second level</a:t>
             </a:r>
+            <a:endParaRPr lang="en-US"/>
           </a:p>
           <a:p>
             <a:pPr lvl="2"/>
@@ -5098,6 +5042,7 @@
               <a:rPr lang="en-US"/>
               <a:t>Third level</a:t>
             </a:r>
+            <a:endParaRPr lang="en-US"/>
           </a:p>
           <a:p>
             <a:pPr lvl="3"/>
@@ -5105,6 +5050,7 @@
               <a:rPr lang="en-US"/>
               <a:t>Fourth level</a:t>
             </a:r>
+            <a:endParaRPr lang="en-US"/>
           </a:p>
           <a:p>
             <a:pPr lvl="4"/>
@@ -5151,7 +5097,6 @@
           <a:p>
             <a:fld id="{6D007ABD-EBBA-4429-9D37-844ACA18E6CA}" type="datetimeFigureOut">
               <a:rPr lang="en-IN" smtClean="0"/>
-              <a:t>09-07-2025</a:t>
             </a:fld>
             <a:endParaRPr lang="en-IN"/>
           </a:p>
@@ -5229,38 +5174,32 @@
           <a:p>
             <a:fld id="{DE243CA5-354C-49F7-9CA7-110AF9512DB1}" type="slidenum">
               <a:rPr lang="en-IN" smtClean="0"/>
-              <a:t>‹#›</a:t>
             </a:fld>
             <a:endParaRPr lang="en-IN"/>
           </a:p>
         </p:txBody>
       </p:sp>
     </p:spTree>
-    <p:extLst>
-      <p:ext uri="{BB962C8B-B14F-4D97-AF65-F5344CB8AC3E}">
-        <p14:creationId xmlns:p14="http://schemas.microsoft.com/office/powerpoint/2010/main" val="2039567307"/>
-      </p:ext>
-    </p:extLst>
   </p:cSld>
   <p:clrMap bg1="dk1" tx1="lt1" bg2="dk2" tx2="lt2" accent1="accent1" accent2="accent2" accent3="accent3" accent4="accent4" accent5="accent5" accent6="accent6" hlink="hlink" folHlink="folHlink"/>
   <p:sldLayoutIdLst>
-    <p:sldLayoutId id="2147483696" r:id="rId1"/>
-    <p:sldLayoutId id="2147483697" r:id="rId2"/>
-    <p:sldLayoutId id="2147483698" r:id="rId3"/>
-    <p:sldLayoutId id="2147483699" r:id="rId4"/>
-    <p:sldLayoutId id="2147483700" r:id="rId5"/>
-    <p:sldLayoutId id="2147483701" r:id="rId6"/>
-    <p:sldLayoutId id="2147483702" r:id="rId7"/>
-    <p:sldLayoutId id="2147483703" r:id="rId8"/>
-    <p:sldLayoutId id="2147483704" r:id="rId9"/>
-    <p:sldLayoutId id="2147483705" r:id="rId10"/>
-    <p:sldLayoutId id="2147483706" r:id="rId11"/>
-    <p:sldLayoutId id="2147483707" r:id="rId12"/>
-    <p:sldLayoutId id="2147483708" r:id="rId13"/>
-    <p:sldLayoutId id="2147483709" r:id="rId14"/>
-    <p:sldLayoutId id="2147483710" r:id="rId15"/>
-    <p:sldLayoutId id="2147483711" r:id="rId16"/>
-    <p:sldLayoutId id="2147483712" r:id="rId17"/>
+    <p:sldLayoutId id="2147483649" r:id="rId1"/>
+    <p:sldLayoutId id="2147483650" r:id="rId2"/>
+    <p:sldLayoutId id="2147483651" r:id="rId3"/>
+    <p:sldLayoutId id="2147483652" r:id="rId4"/>
+    <p:sldLayoutId id="2147483653" r:id="rId5"/>
+    <p:sldLayoutId id="2147483654" r:id="rId6"/>
+    <p:sldLayoutId id="2147483655" r:id="rId7"/>
+    <p:sldLayoutId id="2147483656" r:id="rId8"/>
+    <p:sldLayoutId id="2147483657" r:id="rId9"/>
+    <p:sldLayoutId id="2147483658" r:id="rId10"/>
+    <p:sldLayoutId id="2147483659" r:id="rId11"/>
+    <p:sldLayoutId id="2147483660" r:id="rId12"/>
+    <p:sldLayoutId id="2147483661" r:id="rId13"/>
+    <p:sldLayoutId id="2147483662" r:id="rId14"/>
+    <p:sldLayoutId id="2147483663" r:id="rId15"/>
+    <p:sldLayoutId id="2147483664" r:id="rId16"/>
+    <p:sldLayoutId id="2147483665" r:id="rId17"/>
   </p:sldLayoutIdLst>
   <p:txStyles>
     <p:titleStyle>
@@ -5634,26 +5573,14 @@
       </p:grpSpPr>
       <p:pic>
         <p:nvPicPr>
-          <p:cNvPr id="3" name="Picture 2" descr="A close-up of a graph&#10;&#10;AI-generated content may be incorrect.">
-            <a:extLst>
-              <a:ext uri="{FF2B5EF4-FFF2-40B4-BE49-F238E27FC236}">
-                <a16:creationId xmlns:a16="http://schemas.microsoft.com/office/drawing/2014/main" id="{0580C213-C8AC-89B0-709B-93750192208D}"/>
-              </a:ext>
-            </a:extLst>
-          </p:cNvPr>
+          <p:cNvPr id="2" name="Picture 1" descr="retail"/>
           <p:cNvPicPr>
             <a:picLocks noChangeAspect="1"/>
           </p:cNvPicPr>
           <p:nvPr/>
         </p:nvPicPr>
         <p:blipFill>
-          <a:blip r:embed="rId2">
-            <a:extLst>
-              <a:ext uri="{28A0092B-C50C-407E-A947-70E740481C1C}">
-                <a14:useLocalDpi xmlns:a14="http://schemas.microsoft.com/office/drawing/2010/main" val="0"/>
-              </a:ext>
-            </a:extLst>
-          </a:blip>
+          <a:blip r:embed="rId1"/>
           <a:stretch>
             <a:fillRect/>
           </a:stretch>
@@ -5669,11 +5596,6 @@
         </p:spPr>
       </p:pic>
     </p:spTree>
-    <p:extLst>
-      <p:ext uri="{BB962C8B-B14F-4D97-AF65-F5344CB8AC3E}">
-        <p14:creationId xmlns:p14="http://schemas.microsoft.com/office/powerpoint/2010/main" val="3274356401"/>
-      </p:ext>
-    </p:extLst>
   </p:cSld>
   <p:clrMapOvr>
     <a:masterClrMapping/>
@@ -5700,13 +5622,7 @@
       </p:grpSpPr>
       <p:sp>
         <p:nvSpPr>
-          <p:cNvPr id="9" name="Title 1">
-            <a:extLst>
-              <a:ext uri="{FF2B5EF4-FFF2-40B4-BE49-F238E27FC236}">
-                <a16:creationId xmlns:a16="http://schemas.microsoft.com/office/drawing/2014/main" id="{81E54873-BE61-CC6E-16D2-862BBFB61625}"/>
-              </a:ext>
-            </a:extLst>
-          </p:cNvPr>
+          <p:cNvPr id="9" name="Title 1"/>
           <p:cNvSpPr>
             <a:spLocks noGrp="1"/>
           </p:cNvSpPr>
@@ -5749,13 +5665,7 @@
       </p:sp>
       <p:sp>
         <p:nvSpPr>
-          <p:cNvPr id="5" name="Content Placeholder 4">
-            <a:extLst>
-              <a:ext uri="{FF2B5EF4-FFF2-40B4-BE49-F238E27FC236}">
-                <a16:creationId xmlns:a16="http://schemas.microsoft.com/office/drawing/2014/main" id="{31E3A5E4-C3AB-AEFD-83C7-66C7F4884313}"/>
-              </a:ext>
-            </a:extLst>
-          </p:cNvPr>
+          <p:cNvPr id="5" name="Content Placeholder 4"/>
           <p:cNvSpPr>
             <a:spLocks noGrp="1"/>
           </p:cNvSpPr>
@@ -5785,6 +5695,10 @@
               </a:rPr>
               <a:t>This project was a true turning point in my Excel journey — where I moved beyond formulas to solving real-world business problems.</a:t>
             </a:r>
+            <a:endParaRPr lang="en-US" sz="2000" b="0" dirty="0">
+              <a:effectLst/>
+              <a:latin typeface="-apple-system"/>
+            </a:endParaRPr>
           </a:p>
           <a:p>
             <a:pPr marL="0" indent="0" fontAlgn="base">
@@ -5806,6 +5720,10 @@
               </a:rPr>
               <a:t>It sharpened my ability to:</a:t>
             </a:r>
+            <a:endParaRPr lang="en-US" sz="2000" b="0" dirty="0">
+              <a:effectLst/>
+              <a:latin typeface="-apple-system"/>
+            </a:endParaRPr>
           </a:p>
           <a:p>
             <a:pPr fontAlgn="base"/>
@@ -5816,6 +5734,10 @@
               </a:rPr>
               <a:t> Transform and model data using Power Query</a:t>
             </a:r>
+            <a:endParaRPr lang="en-US" sz="2000" b="0" dirty="0">
+              <a:effectLst/>
+              <a:latin typeface="-apple-system"/>
+            </a:endParaRPr>
           </a:p>
           <a:p>
             <a:pPr fontAlgn="base"/>
@@ -5826,6 +5748,10 @@
               </a:rPr>
               <a:t> Extract insights with purpose-driven pivot analysis</a:t>
             </a:r>
+            <a:endParaRPr lang="en-US" sz="2000" b="0" dirty="0">
+              <a:effectLst/>
+              <a:latin typeface="-apple-system"/>
+            </a:endParaRPr>
           </a:p>
           <a:p>
             <a:pPr fontAlgn="base"/>
@@ -5836,6 +5762,10 @@
               </a:rPr>
               <a:t> Design dashboards that tell stories, not just show numbers</a:t>
             </a:r>
+            <a:endParaRPr lang="en-US" sz="2000" b="0" dirty="0">
+              <a:effectLst/>
+              <a:latin typeface="-apple-system"/>
+            </a:endParaRPr>
           </a:p>
           <a:p>
             <a:pPr fontAlgn="base"/>
@@ -5858,11 +5788,6 @@
         </p:txBody>
       </p:sp>
     </p:spTree>
-    <p:extLst>
-      <p:ext uri="{BB962C8B-B14F-4D97-AF65-F5344CB8AC3E}">
-        <p14:creationId xmlns:p14="http://schemas.microsoft.com/office/powerpoint/2010/main" val="4261236028"/>
-      </p:ext>
-    </p:extLst>
   </p:cSld>
   <p:clrMapOvr>
     <a:masterClrMapping/>
@@ -5889,13 +5814,7 @@
       </p:grpSpPr>
       <p:sp>
         <p:nvSpPr>
-          <p:cNvPr id="9" name="Title 1">
-            <a:extLst>
-              <a:ext uri="{FF2B5EF4-FFF2-40B4-BE49-F238E27FC236}">
-                <a16:creationId xmlns:a16="http://schemas.microsoft.com/office/drawing/2014/main" id="{81E54873-BE61-CC6E-16D2-862BBFB61625}"/>
-              </a:ext>
-            </a:extLst>
-          </p:cNvPr>
+          <p:cNvPr id="9" name="Title 1"/>
           <p:cNvSpPr>
             <a:spLocks noGrp="1"/>
           </p:cNvSpPr>
@@ -5938,13 +5857,7 @@
       </p:sp>
       <p:sp>
         <p:nvSpPr>
-          <p:cNvPr id="5" name="Content Placeholder 4">
-            <a:extLst>
-              <a:ext uri="{FF2B5EF4-FFF2-40B4-BE49-F238E27FC236}">
-                <a16:creationId xmlns:a16="http://schemas.microsoft.com/office/drawing/2014/main" id="{31E3A5E4-C3AB-AEFD-83C7-66C7F4884313}"/>
-              </a:ext>
-            </a:extLst>
-          </p:cNvPr>
+          <p:cNvPr id="5" name="Content Placeholder 4"/>
           <p:cNvSpPr>
             <a:spLocks noGrp="1"/>
           </p:cNvSpPr>
@@ -5974,6 +5887,10 @@
               </a:rPr>
               <a:t>More than just a technical task, this dashboard taught me how to connect data with decision-making — and how a tool as simple as Excel can be turned into a strategic advantage when used with clarity, intent, and creativity.</a:t>
             </a:r>
+            <a:endParaRPr lang="en-US" sz="2000" b="0" dirty="0">
+              <a:effectLst/>
+              <a:latin typeface="-apple-system"/>
+            </a:endParaRPr>
           </a:p>
           <a:p>
             <a:pPr marL="0" indent="0">
@@ -5993,11 +5910,6 @@
         </p:txBody>
       </p:sp>
     </p:spTree>
-    <p:extLst>
-      <p:ext uri="{BB962C8B-B14F-4D97-AF65-F5344CB8AC3E}">
-        <p14:creationId xmlns:p14="http://schemas.microsoft.com/office/powerpoint/2010/main" val="1093646458"/>
-      </p:ext>
-    </p:extLst>
   </p:cSld>
   <p:clrMapOvr>
     <a:masterClrMapping/>
@@ -6024,20 +5936,14 @@
       </p:grpSpPr>
       <p:pic>
         <p:nvPicPr>
-          <p:cNvPr id="5" name="Picture 4" descr="A close-up of a document&#10;&#10;AI-generated content may be incorrect.">
-            <a:extLst>
-              <a:ext uri="{FF2B5EF4-FFF2-40B4-BE49-F238E27FC236}">
-                <a16:creationId xmlns:a16="http://schemas.microsoft.com/office/drawing/2014/main" id="{96F45DAF-7D63-D6E1-9186-8CDBC9D925F1}"/>
-              </a:ext>
-            </a:extLst>
-          </p:cNvPr>
+          <p:cNvPr id="5" name="Picture 4" descr="A close-up of a document&#10;&#10;AI-generated content may be incorrect."/>
           <p:cNvPicPr>
             <a:picLocks noChangeAspect="1"/>
           </p:cNvPicPr>
           <p:nvPr/>
         </p:nvPicPr>
         <p:blipFill>
-          <a:blip r:embed="rId2">
+          <a:blip r:embed="rId1">
             <a:extLst>
               <a:ext uri="{28A0092B-C50C-407E-A947-70E740481C1C}">
                 <a14:useLocalDpi xmlns:a14="http://schemas.microsoft.com/office/drawing/2010/main" val="0"/>
@@ -6059,11 +5965,6 @@
         </p:spPr>
       </p:pic>
     </p:spTree>
-    <p:extLst>
-      <p:ext uri="{BB962C8B-B14F-4D97-AF65-F5344CB8AC3E}">
-        <p14:creationId xmlns:p14="http://schemas.microsoft.com/office/powerpoint/2010/main" val="3998828676"/>
-      </p:ext>
-    </p:extLst>
   </p:cSld>
   <p:clrMapOvr>
     <a:masterClrMapping/>
@@ -6090,13 +5991,7 @@
       </p:grpSpPr>
       <p:sp>
         <p:nvSpPr>
-          <p:cNvPr id="2" name="Title 1">
-            <a:extLst>
-              <a:ext uri="{FF2B5EF4-FFF2-40B4-BE49-F238E27FC236}">
-                <a16:creationId xmlns:a16="http://schemas.microsoft.com/office/drawing/2014/main" id="{6E36F103-823B-29DB-A420-3382EB0DFDC5}"/>
-              </a:ext>
-            </a:extLst>
-          </p:cNvPr>
+          <p:cNvPr id="2" name="Title 1"/>
           <p:cNvSpPr>
             <a:spLocks noGrp="1"/>
           </p:cNvSpPr>
@@ -6106,8 +6001,8 @@
         </p:nvSpPr>
         <p:spPr>
           <a:xfrm>
-            <a:off x="0" y="2597727"/>
-            <a:ext cx="8977745" cy="1662545"/>
+            <a:off x="0" y="2597785"/>
+            <a:ext cx="11363960" cy="1662430"/>
           </a:xfrm>
           <a:solidFill>
             <a:schemeClr val="bg1"/>
@@ -6117,35 +6012,31 @@
           </a:ln>
         </p:spPr>
         <p:txBody>
-          <a:bodyPr/>
+          <a:bodyPr>
+            <a:noAutofit/>
+          </a:bodyPr>
           <a:lstStyle/>
           <a:p>
             <a:pPr marL="0" indent="0" algn="ctr">
               <a:buNone/>
             </a:pPr>
             <a:r>
-              <a:rPr lang="en-US" sz="4800" b="0" i="0" dirty="0">
+              <a:rPr lang="en-US" sz="4000" b="0" i="0" dirty="0">
                 <a:effectLst/>
                 <a:latin typeface="-apple-system"/>
               </a:rPr>
               <a:t>🔍 Excel Dashboard Project – Retail Sales Insights</a:t>
             </a:r>
-            <a:endParaRPr lang="en-IN" sz="4800" b="0" dirty="0">
+            <a:endParaRPr lang="en-US" sz="4000" b="0" i="0" dirty="0">
               <a:effectLst/>
-              <a:latin typeface="Consolas" panose="020B0609020204030204" pitchFamily="49" charset="0"/>
+              <a:latin typeface="-apple-system"/>
             </a:endParaRPr>
           </a:p>
         </p:txBody>
       </p:sp>
       <p:sp>
         <p:nvSpPr>
-          <p:cNvPr id="3" name="Subtitle 2">
-            <a:extLst>
-              <a:ext uri="{FF2B5EF4-FFF2-40B4-BE49-F238E27FC236}">
-                <a16:creationId xmlns:a16="http://schemas.microsoft.com/office/drawing/2014/main" id="{336EA60F-310D-88B5-2C4B-AB37AB86EEC6}"/>
-              </a:ext>
-            </a:extLst>
-          </p:cNvPr>
+          <p:cNvPr id="3" name="Subtitle 2"/>
           <p:cNvSpPr>
             <a:spLocks noGrp="1"/>
           </p:cNvSpPr>
@@ -6174,11 +6065,6 @@
         </p:txBody>
       </p:sp>
     </p:spTree>
-    <p:extLst>
-      <p:ext uri="{BB962C8B-B14F-4D97-AF65-F5344CB8AC3E}">
-        <p14:creationId xmlns:p14="http://schemas.microsoft.com/office/powerpoint/2010/main" val="1191871947"/>
-      </p:ext>
-    </p:extLst>
   </p:cSld>
   <p:clrMapOvr>
     <a:masterClrMapping/>
@@ -6205,13 +6091,7 @@
       </p:grpSpPr>
       <p:sp>
         <p:nvSpPr>
-          <p:cNvPr id="9" name="Title 1">
-            <a:extLst>
-              <a:ext uri="{FF2B5EF4-FFF2-40B4-BE49-F238E27FC236}">
-                <a16:creationId xmlns:a16="http://schemas.microsoft.com/office/drawing/2014/main" id="{81E54873-BE61-CC6E-16D2-862BBFB61625}"/>
-              </a:ext>
-            </a:extLst>
-          </p:cNvPr>
+          <p:cNvPr id="9" name="Title 1"/>
           <p:cNvSpPr>
             <a:spLocks noGrp="1"/>
           </p:cNvSpPr>
@@ -6256,13 +6136,7 @@
       </p:sp>
       <p:sp>
         <p:nvSpPr>
-          <p:cNvPr id="5" name="Content Placeholder 4">
-            <a:extLst>
-              <a:ext uri="{FF2B5EF4-FFF2-40B4-BE49-F238E27FC236}">
-                <a16:creationId xmlns:a16="http://schemas.microsoft.com/office/drawing/2014/main" id="{31E3A5E4-C3AB-AEFD-83C7-66C7F4884313}"/>
-              </a:ext>
-            </a:extLst>
-          </p:cNvPr>
+          <p:cNvPr id="5" name="Content Placeholder 4"/>
           <p:cNvSpPr>
             <a:spLocks noGrp="1"/>
           </p:cNvSpPr>
@@ -6296,6 +6170,10 @@
               </a:rPr>
               <a:t> created an interactive Retail Sales Dashboard by importing a large dataset (5000 rows) using Power Query in Excel. The goal was to solve real business problems using visual insights and pivot analysis.</a:t>
             </a:r>
+            <a:endParaRPr lang="en-IN" b="0" dirty="0">
+              <a:effectLst/>
+              <a:latin typeface="-apple-system"/>
+            </a:endParaRPr>
           </a:p>
           <a:p>
             <a:pPr marL="0" indent="0" fontAlgn="base">
@@ -6315,6 +6193,10 @@
               </a:rPr>
               <a:t>📊 Tool Used: Excel (Power Query, Pivot Table, Map Chart)</a:t>
             </a:r>
+            <a:endParaRPr lang="en-IN" b="0" dirty="0">
+              <a:effectLst/>
+              <a:latin typeface="-apple-system"/>
+            </a:endParaRPr>
           </a:p>
           <a:p>
             <a:pPr fontAlgn="base"/>
@@ -6325,6 +6207,10 @@
               </a:rPr>
               <a:t>📁 Data Source: 5000-row CSV file | Cleaned &amp; Transformed in Power Query</a:t>
             </a:r>
+            <a:endParaRPr lang="en-IN" b="0" dirty="0">
+              <a:effectLst/>
+              <a:latin typeface="-apple-system"/>
+            </a:endParaRPr>
           </a:p>
           <a:p>
             <a:endParaRPr lang="en-IN" dirty="0"/>
@@ -6332,11 +6218,6 @@
         </p:txBody>
       </p:sp>
     </p:spTree>
-    <p:extLst>
-      <p:ext uri="{BB962C8B-B14F-4D97-AF65-F5344CB8AC3E}">
-        <p14:creationId xmlns:p14="http://schemas.microsoft.com/office/powerpoint/2010/main" val="713471384"/>
-      </p:ext>
-    </p:extLst>
   </p:cSld>
   <p:clrMapOvr>
     <a:masterClrMapping/>
@@ -6363,13 +6244,7 @@
       </p:grpSpPr>
       <p:sp>
         <p:nvSpPr>
-          <p:cNvPr id="9" name="Title 1">
-            <a:extLst>
-              <a:ext uri="{FF2B5EF4-FFF2-40B4-BE49-F238E27FC236}">
-                <a16:creationId xmlns:a16="http://schemas.microsoft.com/office/drawing/2014/main" id="{81E54873-BE61-CC6E-16D2-862BBFB61625}"/>
-              </a:ext>
-            </a:extLst>
-          </p:cNvPr>
+          <p:cNvPr id="9" name="Title 1"/>
           <p:cNvSpPr>
             <a:spLocks noGrp="1"/>
           </p:cNvSpPr>
@@ -6414,13 +6289,7 @@
       </p:sp>
       <p:sp>
         <p:nvSpPr>
-          <p:cNvPr id="5" name="Content Placeholder 4">
-            <a:extLst>
-              <a:ext uri="{FF2B5EF4-FFF2-40B4-BE49-F238E27FC236}">
-                <a16:creationId xmlns:a16="http://schemas.microsoft.com/office/drawing/2014/main" id="{31E3A5E4-C3AB-AEFD-83C7-66C7F4884313}"/>
-              </a:ext>
-            </a:extLst>
-          </p:cNvPr>
+          <p:cNvPr id="5" name="Content Placeholder 4"/>
           <p:cNvSpPr>
             <a:spLocks noGrp="1"/>
           </p:cNvSpPr>
@@ -6449,6 +6318,10 @@
               </a:rPr>
               <a:t> Which category is driving sales the most?</a:t>
             </a:r>
+            <a:endParaRPr lang="en-US" b="0" i="0" dirty="0">
+              <a:effectLst/>
+              <a:latin typeface="-apple-system"/>
+            </a:endParaRPr>
           </a:p>
           <a:p>
             <a:pPr algn="l" fontAlgn="base">
@@ -6462,6 +6335,10 @@
               </a:rPr>
               <a:t> How is profit changing over the years?</a:t>
             </a:r>
+            <a:endParaRPr lang="en-US" b="0" i="0" dirty="0">
+              <a:effectLst/>
+              <a:latin typeface="-apple-system"/>
+            </a:endParaRPr>
           </a:p>
           <a:p>
             <a:pPr algn="l" fontAlgn="base">
@@ -6475,6 +6352,10 @@
               </a:rPr>
               <a:t> What are the monthly sales trends?</a:t>
             </a:r>
+            <a:endParaRPr lang="en-US" b="0" i="0" dirty="0">
+              <a:effectLst/>
+              <a:latin typeface="-apple-system"/>
+            </a:endParaRPr>
           </a:p>
           <a:p>
             <a:pPr algn="l" fontAlgn="base">
@@ -6488,6 +6369,10 @@
               </a:rPr>
               <a:t> Who are the top 5 customers by profit?</a:t>
             </a:r>
+            <a:endParaRPr lang="en-US" b="0" i="0" dirty="0">
+              <a:effectLst/>
+              <a:latin typeface="-apple-system"/>
+            </a:endParaRPr>
           </a:p>
           <a:p>
             <a:pPr algn="l" fontAlgn="base">
@@ -6501,6 +6386,10 @@
               </a:rPr>
               <a:t> Which states are contributing the most to sales?</a:t>
             </a:r>
+            <a:endParaRPr lang="en-US" b="0" i="0" dirty="0">
+              <a:effectLst/>
+              <a:latin typeface="-apple-system"/>
+            </a:endParaRPr>
           </a:p>
           <a:p>
             <a:pPr algn="l" fontAlgn="base">
@@ -6514,6 +6403,10 @@
               </a:rPr>
               <a:t> What is the total customer count across years?</a:t>
             </a:r>
+            <a:endParaRPr lang="en-US" b="0" i="0" dirty="0">
+              <a:effectLst/>
+              <a:latin typeface="-apple-system"/>
+            </a:endParaRPr>
           </a:p>
           <a:p>
             <a:pPr algn="l" fontAlgn="base">
@@ -6527,15 +6420,14 @@
               </a:rPr>
               <a:t>Final summary with dynamic filters (Category + Year)</a:t>
             </a:r>
+            <a:endParaRPr lang="en-US" b="0" i="0" dirty="0">
+              <a:effectLst/>
+              <a:latin typeface="-apple-system"/>
+            </a:endParaRPr>
           </a:p>
         </p:txBody>
       </p:sp>
     </p:spTree>
-    <p:extLst>
-      <p:ext uri="{BB962C8B-B14F-4D97-AF65-F5344CB8AC3E}">
-        <p14:creationId xmlns:p14="http://schemas.microsoft.com/office/powerpoint/2010/main" val="1381342966"/>
-      </p:ext>
-    </p:extLst>
   </p:cSld>
   <p:clrMapOvr>
     <a:masterClrMapping/>
@@ -6562,13 +6454,7 @@
       </p:grpSpPr>
       <p:sp>
         <p:nvSpPr>
-          <p:cNvPr id="9" name="Title 1">
-            <a:extLst>
-              <a:ext uri="{FF2B5EF4-FFF2-40B4-BE49-F238E27FC236}">
-                <a16:creationId xmlns:a16="http://schemas.microsoft.com/office/drawing/2014/main" id="{81E54873-BE61-CC6E-16D2-862BBFB61625}"/>
-              </a:ext>
-            </a:extLst>
-          </p:cNvPr>
+          <p:cNvPr id="9" name="Title 1"/>
           <p:cNvSpPr>
             <a:spLocks noGrp="1"/>
           </p:cNvSpPr>
@@ -6613,13 +6499,7 @@
       </p:sp>
       <p:sp>
         <p:nvSpPr>
-          <p:cNvPr id="5" name="Content Placeholder 4">
-            <a:extLst>
-              <a:ext uri="{FF2B5EF4-FFF2-40B4-BE49-F238E27FC236}">
-                <a16:creationId xmlns:a16="http://schemas.microsoft.com/office/drawing/2014/main" id="{31E3A5E4-C3AB-AEFD-83C7-66C7F4884313}"/>
-              </a:ext>
-            </a:extLst>
-          </p:cNvPr>
+          <p:cNvPr id="5" name="Content Placeholder 4"/>
           <p:cNvSpPr>
             <a:spLocks noGrp="1"/>
           </p:cNvSpPr>
@@ -6650,6 +6530,10 @@
               </a:rPr>
               <a:t> Imported data via Power Query and applied cleaning steps.</a:t>
             </a:r>
+            <a:endParaRPr lang="en-US" b="0" dirty="0">
+              <a:effectLst/>
+              <a:latin typeface="-apple-system"/>
+            </a:endParaRPr>
           </a:p>
           <a:p>
             <a:pPr fontAlgn="base">
@@ -6663,6 +6547,10 @@
               </a:rPr>
               <a:t> Extracted Year and Month from Order Date.</a:t>
             </a:r>
+            <a:endParaRPr lang="en-US" b="0" dirty="0">
+              <a:effectLst/>
+              <a:latin typeface="-apple-system"/>
+            </a:endParaRPr>
           </a:p>
           <a:p>
             <a:pPr fontAlgn="base">
@@ -6676,6 +6564,10 @@
               </a:rPr>
               <a:t> Created separate Pivot Tables for each problem.</a:t>
             </a:r>
+            <a:endParaRPr lang="en-US" b="0" dirty="0">
+              <a:effectLst/>
+              <a:latin typeface="-apple-system"/>
+            </a:endParaRPr>
           </a:p>
           <a:p>
             <a:pPr fontAlgn="base">
@@ -6689,6 +6581,10 @@
               </a:rPr>
               <a:t> Used Slicers for interactive filters (Category &amp; Year).</a:t>
             </a:r>
+            <a:endParaRPr lang="en-US" b="0" dirty="0">
+              <a:effectLst/>
+              <a:latin typeface="-apple-system"/>
+            </a:endParaRPr>
           </a:p>
           <a:p>
             <a:pPr fontAlgn="base">
@@ -6702,6 +6598,10 @@
               </a:rPr>
               <a:t> Built visualizations: Bar, Line, Pie, Map, Area Charts.</a:t>
             </a:r>
+            <a:endParaRPr lang="en-US" b="0" dirty="0">
+              <a:effectLst/>
+              <a:latin typeface="-apple-system"/>
+            </a:endParaRPr>
           </a:p>
           <a:p>
             <a:pPr fontAlgn="base">
@@ -6715,6 +6615,10 @@
               </a:rPr>
               <a:t> Designed a clean and color-themed Dashboard layout.</a:t>
             </a:r>
+            <a:endParaRPr lang="en-US" b="0" dirty="0">
+              <a:effectLst/>
+              <a:latin typeface="-apple-system"/>
+            </a:endParaRPr>
           </a:p>
           <a:p>
             <a:pPr>
@@ -6729,11 +6633,6 @@
         </p:txBody>
       </p:sp>
     </p:spTree>
-    <p:extLst>
-      <p:ext uri="{BB962C8B-B14F-4D97-AF65-F5344CB8AC3E}">
-        <p14:creationId xmlns:p14="http://schemas.microsoft.com/office/powerpoint/2010/main" val="3174464862"/>
-      </p:ext>
-    </p:extLst>
   </p:cSld>
   <p:clrMapOvr>
     <a:masterClrMapping/>
@@ -6760,13 +6659,7 @@
       </p:grpSpPr>
       <p:sp>
         <p:nvSpPr>
-          <p:cNvPr id="9" name="Title 1">
-            <a:extLst>
-              <a:ext uri="{FF2B5EF4-FFF2-40B4-BE49-F238E27FC236}">
-                <a16:creationId xmlns:a16="http://schemas.microsoft.com/office/drawing/2014/main" id="{81E54873-BE61-CC6E-16D2-862BBFB61625}"/>
-              </a:ext>
-            </a:extLst>
-          </p:cNvPr>
+          <p:cNvPr id="9" name="Title 1"/>
           <p:cNvSpPr>
             <a:spLocks noGrp="1"/>
           </p:cNvSpPr>
@@ -6800,18 +6693,16 @@
               </a:rPr>
               <a:t>💡 Key Insights &amp; Solutions</a:t>
             </a:r>
-          </a:p>
-        </p:txBody>
-      </p:sp>
-      <p:sp>
-        <p:nvSpPr>
-          <p:cNvPr id="5" name="Content Placeholder 4">
-            <a:extLst>
-              <a:ext uri="{FF2B5EF4-FFF2-40B4-BE49-F238E27FC236}">
-                <a16:creationId xmlns:a16="http://schemas.microsoft.com/office/drawing/2014/main" id="{31E3A5E4-C3AB-AEFD-83C7-66C7F4884313}"/>
-              </a:ext>
-            </a:extLst>
-          </p:cNvPr>
+            <a:endParaRPr lang="en-US" sz="4800" b="0" i="0" dirty="0">
+              <a:effectLst/>
+              <a:latin typeface="-apple-system"/>
+            </a:endParaRPr>
+          </a:p>
+        </p:txBody>
+      </p:sp>
+      <p:sp>
+        <p:nvSpPr>
+          <p:cNvPr id="5" name="Content Placeholder 4"/>
           <p:cNvSpPr>
             <a:spLocks noGrp="1"/>
           </p:cNvSpPr>
@@ -6857,6 +6748,10 @@
               </a:rPr>
               <a:t>1. Sales by Category: Furniture leads in total sales, followed by Office Supplies and Technology.</a:t>
             </a:r>
+            <a:endParaRPr lang="en-US" sz="1800" b="0" i="0" dirty="0">
+              <a:effectLst/>
+              <a:latin typeface="-apple-system"/>
+            </a:endParaRPr>
           </a:p>
           <a:p>
             <a:pPr algn="l" fontAlgn="base">
@@ -6880,6 +6775,10 @@
               </a:rPr>
               <a:t>2. Profit Gained Over Time: Highest profit observed in 2024, majorly driven by Technology.</a:t>
             </a:r>
+            <a:endParaRPr lang="en-US" sz="1800" b="0" i="0" dirty="0">
+              <a:effectLst/>
+              <a:latin typeface="-apple-system"/>
+            </a:endParaRPr>
           </a:p>
           <a:p>
             <a:pPr marL="0" indent="0" algn="l" fontAlgn="base">
@@ -6902,6 +6801,10 @@
               </a:rPr>
               <a:t>3. Monthly Sales Trend: Sales peaked in October; lowest observed in April.</a:t>
             </a:r>
+            <a:endParaRPr lang="en-US" sz="1800" b="0" i="0" dirty="0">
+              <a:effectLst/>
+              <a:latin typeface="-apple-system"/>
+            </a:endParaRPr>
           </a:p>
           <a:p>
             <a:pPr algn="l" fontAlgn="base">
@@ -6953,6 +6856,10 @@
               </a:rPr>
               <a:t> are top contributors.</a:t>
             </a:r>
+            <a:endParaRPr lang="en-US" sz="1800" b="0" i="0" dirty="0">
+              <a:effectLst/>
+              <a:latin typeface="-apple-system"/>
+            </a:endParaRPr>
           </a:p>
           <a:p>
             <a:pPr algn="l" fontAlgn="base">
@@ -6976,6 +6883,10 @@
               </a:rPr>
               <a:t>5. Sales by State: Delhi and West Bengal dominate sales geographically.</a:t>
             </a:r>
+            <a:endParaRPr lang="en-US" sz="1800" b="0" i="0" dirty="0">
+              <a:effectLst/>
+              <a:latin typeface="-apple-system"/>
+            </a:endParaRPr>
           </a:p>
           <a:p>
             <a:pPr marL="0" indent="0" algn="l" fontAlgn="base">
@@ -6998,15 +6909,14 @@
               </a:rPr>
               <a:t>6. Customer Count per Year: Steady growth in customer count, with a sharp rise in 2024.</a:t>
             </a:r>
+            <a:endParaRPr lang="en-US" sz="1800" b="0" i="0" dirty="0">
+              <a:effectLst/>
+              <a:latin typeface="-apple-system"/>
+            </a:endParaRPr>
           </a:p>
         </p:txBody>
       </p:sp>
     </p:spTree>
-    <p:extLst>
-      <p:ext uri="{BB962C8B-B14F-4D97-AF65-F5344CB8AC3E}">
-        <p14:creationId xmlns:p14="http://schemas.microsoft.com/office/powerpoint/2010/main" val="1145913563"/>
-      </p:ext>
-    </p:extLst>
   </p:cSld>
   <p:clrMapOvr>
     <a:masterClrMapping/>
@@ -7033,20 +6943,14 @@
       </p:grpSpPr>
       <p:pic>
         <p:nvPicPr>
-          <p:cNvPr id="3" name="Picture 2" descr="A screenshot of a computer&#10;&#10;AI-generated content may be incorrect.">
-            <a:extLst>
-              <a:ext uri="{FF2B5EF4-FFF2-40B4-BE49-F238E27FC236}">
-                <a16:creationId xmlns:a16="http://schemas.microsoft.com/office/drawing/2014/main" id="{C9220ED3-5C4B-B4A2-B435-E3E2D078431F}"/>
-              </a:ext>
-            </a:extLst>
-          </p:cNvPr>
+          <p:cNvPr id="3" name="Picture 2" descr="A screenshot of a computer&#10;&#10;AI-generated content may be incorrect."/>
           <p:cNvPicPr>
             <a:picLocks noChangeAspect="1"/>
           </p:cNvPicPr>
           <p:nvPr/>
         </p:nvPicPr>
         <p:blipFill>
-          <a:blip r:embed="rId2">
+          <a:blip r:embed="rId1">
             <a:extLst>
               <a:ext uri="{28A0092B-C50C-407E-A947-70E740481C1C}">
                 <a14:useLocalDpi xmlns:a14="http://schemas.microsoft.com/office/drawing/2010/main" val="0"/>
@@ -7054,7 +6958,9 @@
             </a:extLst>
           </a:blip>
           <a:srcRect l="607" t="13199" r="2500" b="4713"/>
-          <a:stretch/>
+          <a:stretch>
+            <a:fillRect/>
+          </a:stretch>
         </p:blipFill>
         <p:spPr>
           <a:xfrm>
@@ -7067,11 +6973,6 @@
         </p:spPr>
       </p:pic>
     </p:spTree>
-    <p:extLst>
-      <p:ext uri="{BB962C8B-B14F-4D97-AF65-F5344CB8AC3E}">
-        <p14:creationId xmlns:p14="http://schemas.microsoft.com/office/powerpoint/2010/main" val="3877728697"/>
-      </p:ext>
-    </p:extLst>
   </p:cSld>
   <p:clrMapOvr>
     <a:masterClrMapping/>
@@ -7098,13 +6999,7 @@
       </p:grpSpPr>
       <p:sp>
         <p:nvSpPr>
-          <p:cNvPr id="9" name="Title 1">
-            <a:extLst>
-              <a:ext uri="{FF2B5EF4-FFF2-40B4-BE49-F238E27FC236}">
-                <a16:creationId xmlns:a16="http://schemas.microsoft.com/office/drawing/2014/main" id="{81E54873-BE61-CC6E-16D2-862BBFB61625}"/>
-              </a:ext>
-            </a:extLst>
-          </p:cNvPr>
+          <p:cNvPr id="9" name="Title 1"/>
           <p:cNvSpPr>
             <a:spLocks noGrp="1"/>
           </p:cNvSpPr>
@@ -7138,18 +7033,16 @@
               </a:rPr>
               <a:t>🌟 Dashboard Highlights</a:t>
             </a:r>
-          </a:p>
-        </p:txBody>
-      </p:sp>
-      <p:sp>
-        <p:nvSpPr>
-          <p:cNvPr id="5" name="Content Placeholder 4">
-            <a:extLst>
-              <a:ext uri="{FF2B5EF4-FFF2-40B4-BE49-F238E27FC236}">
-                <a16:creationId xmlns:a16="http://schemas.microsoft.com/office/drawing/2014/main" id="{31E3A5E4-C3AB-AEFD-83C7-66C7F4884313}"/>
-              </a:ext>
-            </a:extLst>
-          </p:cNvPr>
+            <a:endParaRPr lang="en-IN" sz="4800" b="0" i="0" dirty="0">
+              <a:effectLst/>
+              <a:latin typeface="-apple-system"/>
+            </a:endParaRPr>
+          </a:p>
+        </p:txBody>
+      </p:sp>
+      <p:sp>
+        <p:nvSpPr>
+          <p:cNvPr id="5" name="Content Placeholder 4"/>
           <p:cNvSpPr>
             <a:spLocks noGrp="1"/>
           </p:cNvSpPr>
@@ -7192,6 +7085,10 @@
               </a:rPr>
               <a:t>Fully dynamic and slicer-controlled dashboard</a:t>
             </a:r>
+            <a:endParaRPr lang="en-IN" sz="2400" b="0" i="0" dirty="0">
+              <a:effectLst/>
+              <a:latin typeface="-apple-system"/>
+            </a:endParaRPr>
           </a:p>
           <a:p>
             <a:pPr algn="l" fontAlgn="base"/>
@@ -7202,6 +7099,10 @@
               </a:rPr>
               <a:t>Covers multi-angle insights: category, time, geography, customer</a:t>
             </a:r>
+            <a:endParaRPr lang="en-IN" sz="2400" b="0" i="0" dirty="0">
+              <a:effectLst/>
+              <a:latin typeface="-apple-system"/>
+            </a:endParaRPr>
           </a:p>
           <a:p>
             <a:pPr algn="l" fontAlgn="base"/>
@@ -7212,6 +7113,10 @@
               </a:rPr>
               <a:t>Designed for clarity, actionability, and user interaction</a:t>
             </a:r>
+            <a:endParaRPr lang="en-IN" sz="2400" b="0" i="0" dirty="0">
+              <a:effectLst/>
+              <a:latin typeface="-apple-system"/>
+            </a:endParaRPr>
           </a:p>
           <a:p>
             <a:pPr algn="l" fontAlgn="base"/>
@@ -7222,15 +7127,14 @@
               </a:rPr>
               <a:t>Built 100% in Excel – no add-ins, just skills!</a:t>
             </a:r>
+            <a:endParaRPr lang="en-IN" sz="2400" b="0" i="0" dirty="0">
+              <a:effectLst/>
+              <a:latin typeface="-apple-system"/>
+            </a:endParaRPr>
           </a:p>
         </p:txBody>
       </p:sp>
     </p:spTree>
-    <p:extLst>
-      <p:ext uri="{BB962C8B-B14F-4D97-AF65-F5344CB8AC3E}">
-        <p14:creationId xmlns:p14="http://schemas.microsoft.com/office/powerpoint/2010/main" val="3957859687"/>
-      </p:ext>
-    </p:extLst>
   </p:cSld>
   <p:clrMapOvr>
     <a:masterClrMapping/>
@@ -7281,7 +7185,7 @@
     </a:clrScheme>
     <a:fontScheme name="Damask">
       <a:majorFont>
-        <a:latin typeface="Bookman Old Style" panose="02050604050505020204"/>
+        <a:latin typeface="Bookman Old Style"/>
         <a:ea typeface=""/>
         <a:cs typeface=""/>
         <a:font script="Jpan" typeface="ＭＳ Ｐゴシック"/>
@@ -7316,7 +7220,7 @@
         <a:font script="Geor" typeface="Sylfaen"/>
       </a:majorFont>
       <a:minorFont>
-        <a:latin typeface="Rockwell" panose="02060603020205020403"/>
+        <a:latin typeface="Rockwell"/>
         <a:ea typeface=""/>
         <a:cs typeface=""/>
         <a:font script="Jpan" typeface="ＭＳ Ｐゴシック"/>
@@ -7479,16 +7383,16 @@
               </a:schemeClr>
             </a:duotone>
           </a:blip>
-          <a:stretch/>
+          <a:stretch>
+            <a:fillRect/>
+          </a:stretch>
         </a:blipFill>
       </a:bgFillStyleLst>
     </a:fmtScheme>
   </a:themeElements>
-  <a:objectDefaults/>
-  <a:extraClrSchemeLst/>
   <a:extLst>
     <a:ext uri="{05A4C25C-085E-4340-85A3-A5531E510DB2}">
-      <thm15:themeFamily xmlns:thm15="http://schemas.microsoft.com/office/thememl/2012/main" name="Damask" id="{F9A299A0-33D0-4E0F-9F3F-7163E3744208}" vid="{746EEEEA-FB6A-406B-B510-531588D54811}"/>
+      <thm15:themeFamily xmlns:thm15="http://schemas.microsoft.com/office/thememl/2012/main" name="Office Theme" id="{62F939B6-93AF-4DB8-9C6B-D6C7DFDC589F}" vid="{4A3C46E8-61CC-4603-A589-7422A47A8E4A}"/>
     </a:ext>
   </a:extLst>
 </a:theme>

</xml_diff>